<commit_message>
CNN model for traffic sign detection(TSD)
</commit_message>
<xml_diff>
--- a/Zeroth Review 2.pptx
+++ b/Zeroth Review 2.pptx
@@ -11,8 +11,11 @@
     <p:sldId id="259" r:id="rId5"/>
     <p:sldId id="260" r:id="rId6"/>
     <p:sldId id="261" r:id="rId7"/>
-    <p:sldId id="262" r:id="rId8"/>
-    <p:sldId id="263" r:id="rId9"/>
+    <p:sldId id="264" r:id="rId8"/>
+    <p:sldId id="265" r:id="rId9"/>
+    <p:sldId id="266" r:id="rId10"/>
+    <p:sldId id="262" r:id="rId11"/>
+    <p:sldId id="263" r:id="rId12"/>
   </p:sldIdLst>
   <p:sldSz cx="12192000" cy="6858000"/>
   <p:notesSz cx="6858000" cy="9144000"/>
@@ -289,7 +292,7 @@
             <a:fld id="{87DE6118-2437-4B30-8E3C-4D2BE6020583}" type="datetimeFigureOut">
               <a:rPr lang="en-US" dirty="0"/>
               <a:pPr/>
-              <a:t>8/17/23</a:t>
+              <a:t>9/9/23</a:t>
             </a:fld>
             <a:endParaRPr lang="en-US" dirty="0"/>
           </a:p>
@@ -615,7 +618,7 @@
           <a:p>
             <a:fld id="{87DE6118-2437-4B30-8E3C-4D2BE6020583}" type="datetimeFigureOut">
               <a:rPr lang="en-US" dirty="0"/>
-              <a:t>8/17/23</a:t>
+              <a:t>9/9/23</a:t>
             </a:fld>
             <a:endParaRPr lang="en-US" dirty="0"/>
           </a:p>
@@ -790,7 +793,7 @@
           <a:p>
             <a:fld id="{87DE6118-2437-4B30-8E3C-4D2BE6020583}" type="datetimeFigureOut">
               <a:rPr lang="en-US" dirty="0"/>
-              <a:t>8/17/23</a:t>
+              <a:t>9/9/23</a:t>
             </a:fld>
             <a:endParaRPr lang="en-US" dirty="0"/>
           </a:p>
@@ -955,7 +958,7 @@
           <a:p>
             <a:fld id="{87DE6118-2437-4B30-8E3C-4D2BE6020583}" type="datetimeFigureOut">
               <a:rPr lang="en-US" dirty="0"/>
-              <a:t>8/17/23</a:t>
+              <a:t>9/9/23</a:t>
             </a:fld>
             <a:endParaRPr lang="en-US" dirty="0"/>
           </a:p>
@@ -1228,7 +1231,7 @@
             <a:fld id="{87DE6118-2437-4B30-8E3C-4D2BE6020583}" type="datetimeFigureOut">
               <a:rPr lang="en-US" dirty="0"/>
               <a:pPr/>
-              <a:t>8/17/23</a:t>
+              <a:t>9/9/23</a:t>
             </a:fld>
             <a:endParaRPr lang="en-US" dirty="0"/>
           </a:p>
@@ -1618,7 +1621,7 @@
           <a:p>
             <a:fld id="{87DE6118-2437-4B30-8E3C-4D2BE6020583}" type="datetimeFigureOut">
               <a:rPr lang="en-US" dirty="0"/>
-              <a:t>8/17/23</a:t>
+              <a:t>9/9/23</a:t>
             </a:fld>
             <a:endParaRPr lang="en-US" dirty="0"/>
           </a:p>
@@ -2090,7 +2093,7 @@
           <a:p>
             <a:fld id="{87DE6118-2437-4B30-8E3C-4D2BE6020583}" type="datetimeFigureOut">
               <a:rPr lang="en-US" dirty="0"/>
-              <a:t>8/17/23</a:t>
+              <a:t>9/9/23</a:t>
             </a:fld>
             <a:endParaRPr lang="en-US" dirty="0"/>
           </a:p>
@@ -2203,7 +2206,7 @@
           <a:p>
             <a:fld id="{87DE6118-2437-4B30-8E3C-4D2BE6020583}" type="datetimeFigureOut">
               <a:rPr lang="en-US" dirty="0"/>
-              <a:t>8/17/23</a:t>
+              <a:t>9/9/23</a:t>
             </a:fld>
             <a:endParaRPr lang="en-US" dirty="0"/>
           </a:p>
@@ -2293,7 +2296,7 @@
           <a:p>
             <a:fld id="{87DE6118-2437-4B30-8E3C-4D2BE6020583}" type="datetimeFigureOut">
               <a:rPr lang="en-US" dirty="0"/>
-              <a:t>8/17/23</a:t>
+              <a:t>9/9/23</a:t>
             </a:fld>
             <a:endParaRPr lang="en-US" dirty="0"/>
           </a:p>
@@ -2635,7 +2638,7 @@
             <a:fld id="{87DE6118-2437-4B30-8E3C-4D2BE6020583}" type="datetimeFigureOut">
               <a:rPr lang="en-US" dirty="0"/>
               <a:pPr/>
-              <a:t>8/17/23</a:t>
+              <a:t>9/9/23</a:t>
             </a:fld>
             <a:endParaRPr lang="en-US" dirty="0"/>
           </a:p>
@@ -3020,7 +3023,7 @@
             <a:fld id="{87DE6118-2437-4B30-8E3C-4D2BE6020583}" type="datetimeFigureOut">
               <a:rPr lang="en-US" dirty="0"/>
               <a:pPr/>
-              <a:t>8/17/23</a:t>
+              <a:t>9/9/23</a:t>
             </a:fld>
             <a:endParaRPr lang="en-US" dirty="0"/>
           </a:p>
@@ -3295,7 +3298,7 @@
             <a:fld id="{87DE6118-2437-4B30-8E3C-4D2BE6020583}" type="datetimeFigureOut">
               <a:rPr lang="en-US" dirty="0"/>
               <a:pPr/>
-              <a:t>8/17/23</a:t>
+              <a:t>9/9/23</a:t>
             </a:fld>
             <a:endParaRPr lang="en-US" dirty="0"/>
           </a:p>
@@ -3879,6 +3882,351 @@
 </p:sld>
 </file>
 
+<file path=ppt/slides/slide10.xml><?xml version="1.0" encoding="utf-8"?>
+<p:sld xmlns:a="http://schemas.openxmlformats.org/drawingml/2006/main" xmlns:r="http://schemas.openxmlformats.org/officeDocument/2006/relationships" xmlns:p="http://schemas.openxmlformats.org/presentationml/2006/main">
+  <p:cSld>
+    <p:spTree>
+      <p:nvGrpSpPr>
+        <p:cNvPr id="1" name=""/>
+        <p:cNvGrpSpPr/>
+        <p:nvPr/>
+      </p:nvGrpSpPr>
+      <p:grpSpPr>
+        <a:xfrm>
+          <a:off x="0" y="0"/>
+          <a:ext cx="0" cy="0"/>
+          <a:chOff x="0" y="0"/>
+          <a:chExt cx="0" cy="0"/>
+        </a:xfrm>
+      </p:grpSpPr>
+      <p:sp>
+        <p:nvSpPr>
+          <p:cNvPr id="2" name="Title 1">
+            <a:extLst>
+              <a:ext uri="{FF2B5EF4-FFF2-40B4-BE49-F238E27FC236}">
+                <a16:creationId xmlns:a16="http://schemas.microsoft.com/office/drawing/2014/main" id="{C64D622F-0F18-3313-B19D-A3C712DBC0CC}"/>
+              </a:ext>
+            </a:extLst>
+          </p:cNvPr>
+          <p:cNvSpPr>
+            <a:spLocks noGrp="1"/>
+          </p:cNvSpPr>
+          <p:nvPr>
+            <p:ph type="title"/>
+          </p:nvPr>
+        </p:nvSpPr>
+        <p:spPr/>
+        <p:txBody>
+          <a:bodyPr/>
+          <a:lstStyle/>
+          <a:p>
+            <a:pPr algn="ctr"/>
+            <a:r>
+              <a:rPr lang="en-US" dirty="0"/>
+              <a:t>Scope</a:t>
+            </a:r>
+          </a:p>
+        </p:txBody>
+      </p:sp>
+      <p:sp>
+        <p:nvSpPr>
+          <p:cNvPr id="3" name="Content Placeholder 2">
+            <a:extLst>
+              <a:ext uri="{FF2B5EF4-FFF2-40B4-BE49-F238E27FC236}">
+                <a16:creationId xmlns:a16="http://schemas.microsoft.com/office/drawing/2014/main" id="{25CF0D0A-4A45-4C97-47C6-87F20BF2B66C}"/>
+              </a:ext>
+            </a:extLst>
+          </p:cNvPr>
+          <p:cNvSpPr>
+            <a:spLocks noGrp="1"/>
+          </p:cNvSpPr>
+          <p:nvPr>
+            <p:ph idx="1"/>
+          </p:nvPr>
+        </p:nvSpPr>
+        <p:spPr>
+          <a:xfrm>
+            <a:off x="1295400" y="1680340"/>
+            <a:ext cx="9601200" cy="3581400"/>
+          </a:xfrm>
+        </p:spPr>
+        <p:txBody>
+          <a:bodyPr/>
+          <a:lstStyle/>
+          <a:p>
+            <a:pPr algn="just">
+              <a:buFont typeface="Wingdings" pitchFamily="2" charset="2"/>
+              <a:buChar char="§"/>
+            </a:pPr>
+            <a:r>
+              <a:rPr lang="en-IN" dirty="0"/>
+              <a:t>The project's scope involves creating an </a:t>
+            </a:r>
+            <a:r>
+              <a:rPr lang="en-IN" b="1" i="1" dirty="0"/>
+              <a:t>accurate traffic sign detection system </a:t>
+            </a:r>
+          </a:p>
+          <a:p>
+            <a:pPr algn="just">
+              <a:buFont typeface="Wingdings" pitchFamily="2" charset="2"/>
+              <a:buChar char="§"/>
+            </a:pPr>
+            <a:r>
+              <a:rPr lang="en-IN" dirty="0"/>
+              <a:t>We are using advanced </a:t>
+            </a:r>
+            <a:r>
+              <a:rPr lang="en-IN" b="1" i="1" dirty="0"/>
+              <a:t>computer vision </a:t>
+            </a:r>
+            <a:r>
+              <a:rPr lang="en-IN" dirty="0"/>
+              <a:t>and </a:t>
+            </a:r>
+            <a:r>
+              <a:rPr lang="en-IN" b="1" i="1" dirty="0"/>
+              <a:t>deep learning techniques</a:t>
+            </a:r>
+            <a:r>
+              <a:rPr lang="en-IN" dirty="0"/>
+              <a:t>. </a:t>
+            </a:r>
+          </a:p>
+          <a:p>
+            <a:pPr algn="just">
+              <a:buFont typeface="Wingdings" pitchFamily="2" charset="2"/>
+              <a:buChar char="§"/>
+            </a:pPr>
+            <a:r>
+              <a:rPr lang="en-IN" dirty="0"/>
+              <a:t>This includes data collection, algorithm development, model training, and real-time processing. </a:t>
+            </a:r>
+          </a:p>
+          <a:p>
+            <a:pPr algn="just">
+              <a:buFont typeface="Wingdings" pitchFamily="2" charset="2"/>
+              <a:buChar char="§"/>
+            </a:pPr>
+            <a:r>
+              <a:rPr lang="en-IN" dirty="0"/>
+              <a:t>The system will accurately locate and classify different types of traffic signs, addressing challenges like varying conditions. </a:t>
+            </a:r>
+          </a:p>
+          <a:p>
+            <a:pPr algn="just">
+              <a:buFont typeface="Wingdings" pitchFamily="2" charset="2"/>
+              <a:buChar char="§"/>
+            </a:pPr>
+            <a:r>
+              <a:rPr lang="en-IN" dirty="0"/>
+              <a:t>It aims to enhance road safety and traffic management, with potential for future expansion and integration into various applications.</a:t>
+            </a:r>
+            <a:endParaRPr lang="en-US" dirty="0"/>
+          </a:p>
+        </p:txBody>
+      </p:sp>
+    </p:spTree>
+    <p:extLst>
+      <p:ext uri="{BB962C8B-B14F-4D97-AF65-F5344CB8AC3E}">
+        <p14:creationId xmlns:p14="http://schemas.microsoft.com/office/powerpoint/2010/main" val="2493971527"/>
+      </p:ext>
+    </p:extLst>
+  </p:cSld>
+  <p:clrMapOvr>
+    <a:masterClrMapping/>
+  </p:clrMapOvr>
+</p:sld>
+</file>
+
+<file path=ppt/slides/slide11.xml><?xml version="1.0" encoding="utf-8"?>
+<p:sld xmlns:a="http://schemas.openxmlformats.org/drawingml/2006/main" xmlns:r="http://schemas.openxmlformats.org/officeDocument/2006/relationships" xmlns:p="http://schemas.openxmlformats.org/presentationml/2006/main">
+  <p:cSld>
+    <p:spTree>
+      <p:nvGrpSpPr>
+        <p:cNvPr id="1" name=""/>
+        <p:cNvGrpSpPr/>
+        <p:nvPr/>
+      </p:nvGrpSpPr>
+      <p:grpSpPr>
+        <a:xfrm>
+          <a:off x="0" y="0"/>
+          <a:ext cx="0" cy="0"/>
+          <a:chOff x="0" y="0"/>
+          <a:chExt cx="0" cy="0"/>
+        </a:xfrm>
+      </p:grpSpPr>
+      <p:sp>
+        <p:nvSpPr>
+          <p:cNvPr id="2" name="Title 1">
+            <a:extLst>
+              <a:ext uri="{FF2B5EF4-FFF2-40B4-BE49-F238E27FC236}">
+                <a16:creationId xmlns:a16="http://schemas.microsoft.com/office/drawing/2014/main" id="{14702EC7-957B-3D7B-C591-0AFC4D35B4CF}"/>
+              </a:ext>
+            </a:extLst>
+          </p:cNvPr>
+          <p:cNvSpPr>
+            <a:spLocks noGrp="1"/>
+          </p:cNvSpPr>
+          <p:nvPr>
+            <p:ph type="title"/>
+          </p:nvPr>
+        </p:nvSpPr>
+        <p:spPr>
+          <a:xfrm>
+            <a:off x="1371600" y="685800"/>
+            <a:ext cx="9601200" cy="722586"/>
+          </a:xfrm>
+        </p:spPr>
+        <p:txBody>
+          <a:bodyPr/>
+          <a:lstStyle/>
+          <a:p>
+            <a:pPr algn="ctr"/>
+            <a:r>
+              <a:rPr lang="en-US" dirty="0"/>
+              <a:t>Reference</a:t>
+            </a:r>
+          </a:p>
+        </p:txBody>
+      </p:sp>
+      <p:sp>
+        <p:nvSpPr>
+          <p:cNvPr id="3" name="Content Placeholder 2">
+            <a:extLst>
+              <a:ext uri="{FF2B5EF4-FFF2-40B4-BE49-F238E27FC236}">
+                <a16:creationId xmlns:a16="http://schemas.microsoft.com/office/drawing/2014/main" id="{F136895F-0CA2-7D8D-B819-BF4EABBFFA60}"/>
+              </a:ext>
+            </a:extLst>
+          </p:cNvPr>
+          <p:cNvSpPr>
+            <a:spLocks noGrp="1"/>
+          </p:cNvSpPr>
+          <p:nvPr>
+            <p:ph idx="1"/>
+          </p:nvPr>
+        </p:nvSpPr>
+        <p:spPr>
+          <a:xfrm>
+            <a:off x="1371600" y="1638299"/>
+            <a:ext cx="9601200" cy="3932183"/>
+          </a:xfrm>
+        </p:spPr>
+        <p:txBody>
+          <a:bodyPr/>
+          <a:lstStyle/>
+          <a:p>
+            <a:pPr>
+              <a:buFont typeface="Wingdings" pitchFamily="2" charset="2"/>
+              <a:buChar char="§"/>
+            </a:pPr>
+            <a:r>
+              <a:rPr lang="en-US" dirty="0"/>
+              <a:t>Dataset Kaggle (</a:t>
+            </a:r>
+            <a:r>
+              <a:rPr lang="en-US" dirty="0">
+                <a:hlinkClick r:id="rId2"/>
+              </a:rPr>
+              <a:t>LINK</a:t>
+            </a:r>
+            <a:r>
+              <a:rPr lang="en-US" dirty="0"/>
+              <a:t>)</a:t>
+            </a:r>
+          </a:p>
+          <a:p>
+            <a:pPr>
+              <a:buFont typeface="Wingdings" pitchFamily="2" charset="2"/>
+              <a:buChar char="§"/>
+            </a:pPr>
+            <a:r>
+              <a:rPr lang="en-US" dirty="0"/>
+              <a:t>Crash Statistics Wikipedia (</a:t>
+            </a:r>
+            <a:r>
+              <a:rPr lang="en-US" dirty="0">
+                <a:hlinkClick r:id="rId3"/>
+              </a:rPr>
+              <a:t>LINK</a:t>
+            </a:r>
+            <a:r>
+              <a:rPr lang="en-US" dirty="0"/>
+              <a:t>)</a:t>
+            </a:r>
+          </a:p>
+          <a:p>
+            <a:pPr>
+              <a:buFont typeface="Wingdings" pitchFamily="2" charset="2"/>
+              <a:buChar char="§"/>
+            </a:pPr>
+            <a:r>
+              <a:rPr lang="en-US" dirty="0"/>
+              <a:t>Research Papers (</a:t>
+            </a:r>
+            <a:r>
+              <a:rPr lang="en-US" dirty="0">
+                <a:hlinkClick r:id="rId4"/>
+              </a:rPr>
+              <a:t>LINK</a:t>
+            </a:r>
+            <a:r>
+              <a:rPr lang="en-US" dirty="0"/>
+              <a:t> </a:t>
+            </a:r>
+            <a:r>
+              <a:rPr lang="en-US" dirty="0">
+                <a:hlinkClick r:id="rId5"/>
+              </a:rPr>
+              <a:t>LINK</a:t>
+            </a:r>
+            <a:r>
+              <a:rPr lang="en-US" dirty="0"/>
+              <a:t>)</a:t>
+            </a:r>
+          </a:p>
+          <a:p>
+            <a:pPr>
+              <a:buFont typeface="Wingdings" pitchFamily="2" charset="2"/>
+              <a:buChar char="§"/>
+            </a:pPr>
+            <a:r>
+              <a:rPr lang="en-US" dirty="0"/>
+              <a:t>Algorithms (</a:t>
+            </a:r>
+            <a:r>
+              <a:rPr lang="en-US" dirty="0">
+                <a:hlinkClick r:id="rId6"/>
+              </a:rPr>
+              <a:t>LINK</a:t>
+            </a:r>
+            <a:r>
+              <a:rPr lang="en-US" dirty="0"/>
+              <a:t>)</a:t>
+            </a:r>
+          </a:p>
+          <a:p>
+            <a:pPr>
+              <a:buFont typeface="Wingdings" pitchFamily="2" charset="2"/>
+              <a:buChar char="§"/>
+            </a:pPr>
+            <a:endParaRPr lang="en-US" dirty="0"/>
+          </a:p>
+        </p:txBody>
+      </p:sp>
+    </p:spTree>
+    <p:extLst>
+      <p:ext uri="{BB962C8B-B14F-4D97-AF65-F5344CB8AC3E}">
+        <p14:creationId xmlns:p14="http://schemas.microsoft.com/office/powerpoint/2010/main" val="1081541707"/>
+      </p:ext>
+    </p:extLst>
+  </p:cSld>
+  <p:clrMapOvr>
+    <a:masterClrMapping/>
+  </p:clrMapOvr>
+</p:sld>
+</file>
+
 <file path=ppt/slides/slide2.xml><?xml version="1.0" encoding="utf-8"?>
 <p:sld xmlns:a="http://schemas.openxmlformats.org/drawingml/2006/main" xmlns:r="http://schemas.openxmlformats.org/officeDocument/2006/relationships" xmlns:p="http://schemas.openxmlformats.org/presentationml/2006/main">
   <p:cSld>
@@ -5032,7 +5380,7 @@
           <p:cNvPr id="2" name="Title 1">
             <a:extLst>
               <a:ext uri="{FF2B5EF4-FFF2-40B4-BE49-F238E27FC236}">
-                <a16:creationId xmlns:a16="http://schemas.microsoft.com/office/drawing/2014/main" id="{C64D622F-0F18-3313-B19D-A3C712DBC0CC}"/>
+                <a16:creationId xmlns:a16="http://schemas.microsoft.com/office/drawing/2014/main" id="{91FF2A73-E6E7-FF2C-0273-DD77F040492E}"/>
               </a:ext>
             </a:extLst>
           </p:cNvPr>
@@ -5051,7 +5399,7 @@
             <a:pPr algn="ctr"/>
             <a:r>
               <a:rPr lang="en-US" dirty="0"/>
-              <a:t>Scope</a:t>
+              <a:t>Requirement Gathering</a:t>
             </a:r>
           </a:p>
         </p:txBody>
@@ -5061,7 +5409,7 @@
           <p:cNvPr id="3" name="Content Placeholder 2">
             <a:extLst>
               <a:ext uri="{FF2B5EF4-FFF2-40B4-BE49-F238E27FC236}">
-                <a16:creationId xmlns:a16="http://schemas.microsoft.com/office/drawing/2014/main" id="{25CF0D0A-4A45-4C97-47C6-87F20BF2B66C}"/>
+                <a16:creationId xmlns:a16="http://schemas.microsoft.com/office/drawing/2014/main" id="{2779701A-F46A-4F78-6A83-63913758397D}"/>
               </a:ext>
             </a:extLst>
           </p:cNvPr>
@@ -5072,92 +5420,172 @@
             <p:ph idx="1"/>
           </p:nvPr>
         </p:nvSpPr>
-        <p:spPr>
-          <a:xfrm>
-            <a:off x="1295400" y="1680340"/>
-            <a:ext cx="9601200" cy="3581400"/>
-          </a:xfrm>
-        </p:spPr>
-        <p:txBody>
-          <a:bodyPr/>
+        <p:spPr/>
+        <p:txBody>
+          <a:bodyPr>
+            <a:noAutofit/>
+          </a:bodyPr>
           <a:lstStyle/>
           <a:p>
-            <a:pPr algn="just">
-              <a:buFont typeface="Wingdings" pitchFamily="2" charset="2"/>
-              <a:buChar char="§"/>
+            <a:pPr algn="l"/>
+            <a:r>
+              <a:rPr lang="en-IN" b="0" i="0" u="none" strike="noStrike" dirty="0">
+                <a:solidFill>
+                  <a:schemeClr val="tx1"/>
+                </a:solidFill>
+                <a:effectLst/>
+              </a:rPr>
+              <a:t>To gather requirements for a traffic sign detection system, follow these steps:</a:t>
+            </a:r>
+          </a:p>
+          <a:p>
+            <a:pPr algn="l">
+              <a:buFont typeface="+mj-lt"/>
+              <a:buAutoNum type="arabicPeriod"/>
             </a:pPr>
             <a:r>
-              <a:rPr lang="en-IN" dirty="0"/>
-              <a:t>The project's scope involves creating an </a:t>
-            </a:r>
-            <a:r>
-              <a:rPr lang="en-IN" b="1" i="1" dirty="0"/>
-              <a:t>accurate traffic sign detection system </a:t>
-            </a:r>
-          </a:p>
-          <a:p>
-            <a:pPr algn="just">
-              <a:buFont typeface="Wingdings" pitchFamily="2" charset="2"/>
-              <a:buChar char="§"/>
+              <a:rPr lang="en-IN" b="1" i="0" u="none" strike="noStrike" dirty="0">
+                <a:solidFill>
+                  <a:schemeClr val="tx1"/>
+                </a:solidFill>
+                <a:effectLst/>
+              </a:rPr>
+              <a:t>Scope Definition:</a:t>
+            </a:r>
+            <a:endParaRPr lang="en-IN" dirty="0">
+              <a:solidFill>
+                <a:schemeClr val="tx1"/>
+              </a:solidFill>
+            </a:endParaRPr>
+          </a:p>
+          <a:p>
+            <a:pPr marL="0" indent="0" algn="l">
+              <a:buNone/>
             </a:pPr>
             <a:r>
-              <a:rPr lang="en-IN" dirty="0"/>
-              <a:t>We are using advanced </a:t>
-            </a:r>
-            <a:r>
-              <a:rPr lang="en-IN" b="1" i="1" dirty="0"/>
-              <a:t>computer vision </a:t>
-            </a:r>
-            <a:r>
-              <a:rPr lang="en-IN" dirty="0"/>
-              <a:t>and </a:t>
-            </a:r>
-            <a:r>
-              <a:rPr lang="en-IN" b="1" i="1" dirty="0"/>
-              <a:t>deep learning techniques</a:t>
-            </a:r>
-            <a:r>
-              <a:rPr lang="en-IN" dirty="0"/>
-              <a:t>. </a:t>
-            </a:r>
-          </a:p>
-          <a:p>
-            <a:pPr algn="just">
-              <a:buFont typeface="Wingdings" pitchFamily="2" charset="2"/>
-              <a:buChar char="§"/>
+              <a:rPr lang="en-IN" b="0" i="0" u="none" strike="noStrike" dirty="0">
+                <a:solidFill>
+                  <a:schemeClr val="tx1"/>
+                </a:solidFill>
+                <a:effectLst/>
+              </a:rPr>
+              <a:t>	Clearly define project goals and boundaries.</a:t>
+            </a:r>
+          </a:p>
+          <a:p>
+            <a:pPr algn="l">
+              <a:buFont typeface="+mj-lt"/>
+              <a:buAutoNum type="arabicPeriod"/>
             </a:pPr>
             <a:r>
-              <a:rPr lang="en-IN" dirty="0"/>
-              <a:t>This includes data collection, algorithm development, model training, and real-time processing. </a:t>
-            </a:r>
-          </a:p>
-          <a:p>
-            <a:pPr algn="just">
-              <a:buFont typeface="Wingdings" pitchFamily="2" charset="2"/>
-              <a:buChar char="§"/>
+              <a:rPr lang="en-IN" b="1" i="0" u="none" strike="noStrike" dirty="0">
+                <a:solidFill>
+                  <a:schemeClr val="tx1"/>
+                </a:solidFill>
+                <a:effectLst/>
+              </a:rPr>
+              <a:t>Stakeholder Identification:</a:t>
+            </a:r>
+            <a:endParaRPr lang="en-IN" b="0" i="0" u="none" strike="noStrike" dirty="0">
+              <a:solidFill>
+                <a:schemeClr val="tx1"/>
+              </a:solidFill>
+              <a:effectLst/>
+            </a:endParaRPr>
+          </a:p>
+          <a:p>
+            <a:pPr marL="742950" lvl="1" indent="-285750" algn="l">
+              <a:buFont typeface="+mj-lt"/>
+              <a:buAutoNum type="arabicPeriod"/>
             </a:pPr>
             <a:r>
-              <a:rPr lang="en-IN" dirty="0"/>
-              <a:t>The system will accurately locate and classify different types of traffic signs, addressing challenges like varying conditions. </a:t>
-            </a:r>
-          </a:p>
-          <a:p>
-            <a:pPr algn="just">
-              <a:buFont typeface="Wingdings" pitchFamily="2" charset="2"/>
-              <a:buChar char="§"/>
+              <a:rPr lang="en-IN" b="0" i="0" u="none" strike="noStrike" dirty="0">
+                <a:solidFill>
+                  <a:schemeClr val="tx1"/>
+                </a:solidFill>
+                <a:effectLst/>
+              </a:rPr>
+              <a:t>Identify all involved parties.</a:t>
+            </a:r>
+          </a:p>
+          <a:p>
+            <a:pPr algn="l">
+              <a:buFont typeface="+mj-lt"/>
+              <a:buAutoNum type="arabicPeriod"/>
             </a:pPr>
             <a:r>
-              <a:rPr lang="en-IN" dirty="0"/>
-              <a:t>It aims to enhance road safety and traffic management, with potential for future expansion and integration into various applications.</a:t>
-            </a:r>
-            <a:endParaRPr lang="en-US" dirty="0"/>
+              <a:rPr lang="en-IN" b="1" i="0" u="none" strike="noStrike" dirty="0">
+                <a:solidFill>
+                  <a:schemeClr val="tx1"/>
+                </a:solidFill>
+                <a:effectLst/>
+              </a:rPr>
+              <a:t>Stakeholder Input:</a:t>
+            </a:r>
+            <a:endParaRPr lang="en-IN" b="0" i="0" u="none" strike="noStrike" dirty="0">
+              <a:solidFill>
+                <a:schemeClr val="tx1"/>
+              </a:solidFill>
+              <a:effectLst/>
+            </a:endParaRPr>
+          </a:p>
+          <a:p>
+            <a:pPr marL="742950" lvl="1" indent="-285750" algn="l">
+              <a:buFont typeface="+mj-lt"/>
+              <a:buAutoNum type="arabicPeriod"/>
+            </a:pPr>
+            <a:r>
+              <a:rPr lang="en-IN" b="0" i="0" u="none" strike="noStrike" dirty="0">
+                <a:solidFill>
+                  <a:schemeClr val="tx1"/>
+                </a:solidFill>
+                <a:effectLst/>
+              </a:rPr>
+              <a:t>Gather input through interviews or surveys.</a:t>
+            </a:r>
+          </a:p>
+          <a:p>
+            <a:pPr algn="l">
+              <a:buFont typeface="+mj-lt"/>
+              <a:buAutoNum type="arabicPeriod"/>
+            </a:pPr>
+            <a:r>
+              <a:rPr lang="en-IN" b="1" i="0" u="none" strike="noStrike" dirty="0">
+                <a:solidFill>
+                  <a:schemeClr val="tx1"/>
+                </a:solidFill>
+                <a:effectLst/>
+              </a:rPr>
+              <a:t>Analyse Existing Systems (if any):</a:t>
+            </a:r>
+            <a:endParaRPr lang="en-IN" b="0" i="0" u="none" strike="noStrike" dirty="0">
+              <a:solidFill>
+                <a:schemeClr val="tx1"/>
+              </a:solidFill>
+              <a:effectLst/>
+            </a:endParaRPr>
+          </a:p>
+          <a:p>
+            <a:pPr marL="742950" lvl="1" indent="-285750" algn="l">
+              <a:buFont typeface="+mj-lt"/>
+              <a:buAutoNum type="arabicPeriod"/>
+            </a:pPr>
+            <a:r>
+              <a:rPr lang="en-IN" b="0" i="0" u="none" strike="noStrike" dirty="0">
+                <a:solidFill>
+                  <a:schemeClr val="tx1"/>
+                </a:solidFill>
+                <a:effectLst/>
+              </a:rPr>
+              <a:t>Evaluate strengths and weaknesses.</a:t>
+            </a:r>
           </a:p>
         </p:txBody>
       </p:sp>
     </p:spTree>
     <p:extLst>
       <p:ext uri="{BB962C8B-B14F-4D97-AF65-F5344CB8AC3E}">
-        <p14:creationId xmlns:p14="http://schemas.microsoft.com/office/powerpoint/2010/main" val="2493971527"/>
+        <p14:creationId xmlns:p14="http://schemas.microsoft.com/office/powerpoint/2010/main" val="1978781931"/>
       </p:ext>
     </p:extLst>
   </p:cSld>
@@ -5186,10 +5614,504 @@
       </p:grpSpPr>
       <p:sp>
         <p:nvSpPr>
+          <p:cNvPr id="2" name="TextBox 1">
+            <a:extLst>
+              <a:ext uri="{FF2B5EF4-FFF2-40B4-BE49-F238E27FC236}">
+                <a16:creationId xmlns:a16="http://schemas.microsoft.com/office/drawing/2014/main" id="{34D02CFF-A383-0FF9-CFD6-D26F46EBACBB}"/>
+              </a:ext>
+            </a:extLst>
+          </p:cNvPr>
+          <p:cNvSpPr txBox="1"/>
+          <p:nvPr/>
+        </p:nvSpPr>
+        <p:spPr>
+          <a:xfrm>
+            <a:off x="985838" y="185081"/>
+            <a:ext cx="9658350" cy="7017306"/>
+          </a:xfrm>
+          <a:prstGeom prst="rect">
+            <a:avLst/>
+          </a:prstGeom>
+          <a:noFill/>
+        </p:spPr>
+        <p:txBody>
+          <a:bodyPr wrap="square" rtlCol="0">
+            <a:spAutoFit/>
+          </a:bodyPr>
+          <a:lstStyle/>
+          <a:p>
+            <a:pPr algn="l">
+              <a:buFont typeface="+mj-lt"/>
+              <a:buAutoNum type="arabicPeriod"/>
+            </a:pPr>
+            <a:r>
+              <a:rPr lang="en-IN" b="1" i="0" u="none" strike="noStrike" dirty="0">
+                <a:solidFill>
+                  <a:schemeClr val="tx1"/>
+                </a:solidFill>
+                <a:effectLst/>
+              </a:rPr>
+              <a:t>Legal and Safety Compliance:</a:t>
+            </a:r>
+            <a:endParaRPr lang="en-IN" b="0" i="0" u="none" strike="noStrike" dirty="0">
+              <a:solidFill>
+                <a:schemeClr val="tx1"/>
+              </a:solidFill>
+              <a:effectLst/>
+            </a:endParaRPr>
+          </a:p>
+          <a:p>
+            <a:pPr marL="742950" lvl="1" indent="-285750" algn="l">
+              <a:buFont typeface="+mj-lt"/>
+              <a:buAutoNum type="arabicPeriod"/>
+            </a:pPr>
+            <a:r>
+              <a:rPr lang="en-IN" b="0" i="0" u="none" strike="noStrike" dirty="0">
+                <a:solidFill>
+                  <a:schemeClr val="tx1"/>
+                </a:solidFill>
+                <a:effectLst/>
+              </a:rPr>
+              <a:t>Ensure adherence to regulations and safety standards.</a:t>
+            </a:r>
+          </a:p>
+          <a:p>
+            <a:pPr algn="l">
+              <a:buFont typeface="+mj-lt"/>
+              <a:buAutoNum type="arabicPeriod"/>
+            </a:pPr>
+            <a:r>
+              <a:rPr lang="en-IN" b="1" i="0" u="none" strike="noStrike" dirty="0">
+                <a:solidFill>
+                  <a:schemeClr val="tx1"/>
+                </a:solidFill>
+                <a:effectLst/>
+              </a:rPr>
+              <a:t>Functional Requirements:</a:t>
+            </a:r>
+            <a:endParaRPr lang="en-IN" b="0" i="0" u="none" strike="noStrike" dirty="0">
+              <a:solidFill>
+                <a:schemeClr val="tx1"/>
+              </a:solidFill>
+              <a:effectLst/>
+            </a:endParaRPr>
+          </a:p>
+          <a:p>
+            <a:pPr marL="742950" lvl="1" indent="-285750" algn="l">
+              <a:buFont typeface="+mj-lt"/>
+              <a:buAutoNum type="arabicPeriod"/>
+            </a:pPr>
+            <a:r>
+              <a:rPr lang="en-IN" b="0" i="0" u="none" strike="noStrike" dirty="0">
+                <a:solidFill>
+                  <a:schemeClr val="tx1"/>
+                </a:solidFill>
+                <a:effectLst/>
+              </a:rPr>
+              <a:t>Specify what the system should do.</a:t>
+            </a:r>
+          </a:p>
+          <a:p>
+            <a:pPr algn="l">
+              <a:buFont typeface="+mj-lt"/>
+              <a:buAutoNum type="arabicPeriod"/>
+            </a:pPr>
+            <a:r>
+              <a:rPr lang="en-IN" b="1" i="0" u="none" strike="noStrike" dirty="0">
+                <a:solidFill>
+                  <a:schemeClr val="tx1"/>
+                </a:solidFill>
+                <a:effectLst/>
+              </a:rPr>
+              <a:t>Non-functional Requirements:</a:t>
+            </a:r>
+            <a:endParaRPr lang="en-IN" b="0" i="0" u="none" strike="noStrike" dirty="0">
+              <a:solidFill>
+                <a:schemeClr val="tx1"/>
+              </a:solidFill>
+              <a:effectLst/>
+            </a:endParaRPr>
+          </a:p>
+          <a:p>
+            <a:pPr marL="742950" lvl="1" indent="-285750" algn="l">
+              <a:buFont typeface="+mj-lt"/>
+              <a:buAutoNum type="arabicPeriod"/>
+            </a:pPr>
+            <a:r>
+              <a:rPr lang="en-IN" b="0" i="0" u="none" strike="noStrike" dirty="0">
+                <a:solidFill>
+                  <a:schemeClr val="tx1"/>
+                </a:solidFill>
+                <a:effectLst/>
+              </a:rPr>
+              <a:t>Address performance and reliability.</a:t>
+            </a:r>
+          </a:p>
+          <a:p>
+            <a:pPr algn="l">
+              <a:buFont typeface="+mj-lt"/>
+              <a:buAutoNum type="arabicPeriod"/>
+            </a:pPr>
+            <a:r>
+              <a:rPr lang="en-IN" b="1" i="0" u="none" strike="noStrike" dirty="0">
+                <a:solidFill>
+                  <a:schemeClr val="tx1"/>
+                </a:solidFill>
+                <a:effectLst/>
+              </a:rPr>
+              <a:t>Data Requirements:</a:t>
+            </a:r>
+            <a:endParaRPr lang="en-IN" b="0" i="0" u="none" strike="noStrike" dirty="0">
+              <a:solidFill>
+                <a:schemeClr val="tx1"/>
+              </a:solidFill>
+              <a:effectLst/>
+            </a:endParaRPr>
+          </a:p>
+          <a:p>
+            <a:pPr marL="742950" lvl="1" indent="-285750" algn="l">
+              <a:buFont typeface="+mj-lt"/>
+              <a:buAutoNum type="arabicPeriod"/>
+            </a:pPr>
+            <a:r>
+              <a:rPr lang="en-IN" b="0" i="0" u="none" strike="noStrike" dirty="0">
+                <a:solidFill>
+                  <a:schemeClr val="tx1"/>
+                </a:solidFill>
+                <a:effectLst/>
+              </a:rPr>
+              <a:t>Define data sources and quality.</a:t>
+            </a:r>
+          </a:p>
+          <a:p>
+            <a:pPr algn="l">
+              <a:buFont typeface="+mj-lt"/>
+              <a:buAutoNum type="arabicPeriod"/>
+            </a:pPr>
+            <a:r>
+              <a:rPr lang="en-IN" b="1" i="0" u="none" strike="noStrike" dirty="0">
+                <a:solidFill>
+                  <a:schemeClr val="tx1"/>
+                </a:solidFill>
+                <a:effectLst/>
+              </a:rPr>
+              <a:t>Integration Needs:</a:t>
+            </a:r>
+            <a:endParaRPr lang="en-IN" b="0" i="0" u="none" strike="noStrike" dirty="0">
+              <a:solidFill>
+                <a:schemeClr val="tx1"/>
+              </a:solidFill>
+              <a:effectLst/>
+            </a:endParaRPr>
+          </a:p>
+          <a:p>
+            <a:pPr marL="742950" lvl="1" indent="-285750" algn="l">
+              <a:buFont typeface="+mj-lt"/>
+              <a:buAutoNum type="arabicPeriod"/>
+            </a:pPr>
+            <a:r>
+              <a:rPr lang="en-IN" b="0" i="0" u="none" strike="noStrike" dirty="0">
+                <a:solidFill>
+                  <a:schemeClr val="tx1"/>
+                </a:solidFill>
+                <a:effectLst/>
+              </a:rPr>
+              <a:t>Determine if integration is necessary.</a:t>
+            </a:r>
+          </a:p>
+          <a:p>
+            <a:pPr algn="l">
+              <a:buFont typeface="+mj-lt"/>
+              <a:buAutoNum type="arabicPeriod"/>
+            </a:pPr>
+            <a:r>
+              <a:rPr lang="en-IN" b="1" i="0" u="none" strike="noStrike" dirty="0">
+                <a:solidFill>
+                  <a:schemeClr val="tx1"/>
+                </a:solidFill>
+                <a:effectLst/>
+              </a:rPr>
+              <a:t>UI/UX Requirements:</a:t>
+            </a:r>
+            <a:endParaRPr lang="en-IN" b="0" i="0" u="none" strike="noStrike" dirty="0">
+              <a:solidFill>
+                <a:schemeClr val="tx1"/>
+              </a:solidFill>
+              <a:effectLst/>
+            </a:endParaRPr>
+          </a:p>
+          <a:p>
+            <a:pPr marL="742950" lvl="1" indent="-285750" algn="l">
+              <a:buFont typeface="+mj-lt"/>
+              <a:buAutoNum type="arabicPeriod"/>
+            </a:pPr>
+            <a:r>
+              <a:rPr lang="en-IN" b="0" i="0" u="none" strike="noStrike" dirty="0">
+                <a:solidFill>
+                  <a:schemeClr val="tx1"/>
+                </a:solidFill>
+                <a:effectLst/>
+              </a:rPr>
+              <a:t>Outline user interface expectations.</a:t>
+            </a:r>
+          </a:p>
+          <a:p>
+            <a:pPr algn="l">
+              <a:buFont typeface="+mj-lt"/>
+              <a:buAutoNum type="arabicPeriod"/>
+            </a:pPr>
+            <a:r>
+              <a:rPr lang="en-IN" b="1" i="0" u="none" strike="noStrike" dirty="0">
+                <a:solidFill>
+                  <a:schemeClr val="tx1"/>
+                </a:solidFill>
+                <a:effectLst/>
+              </a:rPr>
+              <a:t>Testing and Validation:</a:t>
+            </a:r>
+            <a:endParaRPr lang="en-IN" b="0" i="0" u="none" strike="noStrike" dirty="0">
+              <a:solidFill>
+                <a:schemeClr val="tx1"/>
+              </a:solidFill>
+              <a:effectLst/>
+            </a:endParaRPr>
+          </a:p>
+          <a:p>
+            <a:pPr marL="742950" lvl="1" indent="-285750" algn="l">
+              <a:buFont typeface="+mj-lt"/>
+              <a:buAutoNum type="arabicPeriod"/>
+            </a:pPr>
+            <a:r>
+              <a:rPr lang="en-IN" b="0" i="0" u="none" strike="noStrike" dirty="0">
+                <a:solidFill>
+                  <a:schemeClr val="tx1"/>
+                </a:solidFill>
+                <a:effectLst/>
+              </a:rPr>
+              <a:t>Define evaluation methods.</a:t>
+            </a:r>
+          </a:p>
+          <a:p>
+            <a:pPr algn="l">
+              <a:buFont typeface="+mj-lt"/>
+              <a:buAutoNum type="arabicPeriod"/>
+            </a:pPr>
+            <a:r>
+              <a:rPr lang="en-IN" b="1" i="0" u="none" strike="noStrike" dirty="0">
+                <a:solidFill>
+                  <a:schemeClr val="tx1"/>
+                </a:solidFill>
+                <a:effectLst/>
+              </a:rPr>
+              <a:t>Maintenance and Support:</a:t>
+            </a:r>
+            <a:endParaRPr lang="en-IN" b="0" i="0" u="none" strike="noStrike" dirty="0">
+              <a:solidFill>
+                <a:schemeClr val="tx1"/>
+              </a:solidFill>
+              <a:effectLst/>
+            </a:endParaRPr>
+          </a:p>
+          <a:p>
+            <a:pPr marL="742950" lvl="1" indent="-285750" algn="l">
+              <a:buFont typeface="+mj-lt"/>
+              <a:buAutoNum type="arabicPeriod"/>
+            </a:pPr>
+            <a:r>
+              <a:rPr lang="en-IN" b="0" i="0" u="none" strike="noStrike" dirty="0">
+                <a:solidFill>
+                  <a:schemeClr val="tx1"/>
+                </a:solidFill>
+                <a:effectLst/>
+              </a:rPr>
+              <a:t>Plan for post-deployment needs.</a:t>
+            </a:r>
+          </a:p>
+          <a:p>
+            <a:pPr algn="l">
+              <a:buFont typeface="+mj-lt"/>
+              <a:buAutoNum type="arabicPeriod"/>
+            </a:pPr>
+            <a:r>
+              <a:rPr lang="en-IN" b="1" i="0" u="none" strike="noStrike" dirty="0">
+                <a:solidFill>
+                  <a:schemeClr val="tx1"/>
+                </a:solidFill>
+                <a:effectLst/>
+              </a:rPr>
+              <a:t>Documentation and Training:</a:t>
+            </a:r>
+            <a:endParaRPr lang="en-IN" b="0" i="0" u="none" strike="noStrike" dirty="0">
+              <a:solidFill>
+                <a:schemeClr val="tx1"/>
+              </a:solidFill>
+              <a:effectLst/>
+            </a:endParaRPr>
+          </a:p>
+          <a:p>
+            <a:pPr marL="742950" lvl="1" indent="-285750" algn="l">
+              <a:buFont typeface="+mj-lt"/>
+              <a:buAutoNum type="arabicPeriod"/>
+            </a:pPr>
+            <a:r>
+              <a:rPr lang="en-IN" b="0" i="0" u="none" strike="noStrike" dirty="0">
+                <a:solidFill>
+                  <a:schemeClr val="tx1"/>
+                </a:solidFill>
+                <a:effectLst/>
+              </a:rPr>
+              <a:t>Prepare user materials.</a:t>
+            </a:r>
+          </a:p>
+          <a:p>
+            <a:pPr algn="l">
+              <a:buFont typeface="+mj-lt"/>
+              <a:buAutoNum type="arabicPeriod"/>
+            </a:pPr>
+            <a:r>
+              <a:rPr lang="en-IN" b="1" i="0" u="none" strike="noStrike" dirty="0">
+                <a:solidFill>
+                  <a:schemeClr val="tx1"/>
+                </a:solidFill>
+                <a:effectLst/>
+              </a:rPr>
+              <a:t>Cost and Timeline:</a:t>
+            </a:r>
+            <a:endParaRPr lang="en-IN" b="0" i="0" u="none" strike="noStrike" dirty="0">
+              <a:solidFill>
+                <a:schemeClr val="tx1"/>
+              </a:solidFill>
+              <a:effectLst/>
+            </a:endParaRPr>
+          </a:p>
+          <a:p>
+            <a:pPr marL="742950" lvl="1" indent="-285750" algn="l">
+              <a:buFont typeface="+mj-lt"/>
+              <a:buAutoNum type="arabicPeriod"/>
+            </a:pPr>
+            <a:r>
+              <a:rPr lang="en-IN" b="0" i="0" u="none" strike="noStrike" dirty="0">
+                <a:solidFill>
+                  <a:schemeClr val="tx1"/>
+                </a:solidFill>
+                <a:effectLst/>
+              </a:rPr>
+              <a:t>Consider budget and project schedule.</a:t>
+            </a:r>
+          </a:p>
+          <a:p>
+            <a:pPr algn="l">
+              <a:buFont typeface="+mj-lt"/>
+              <a:buAutoNum type="arabicPeriod"/>
+            </a:pPr>
+            <a:r>
+              <a:rPr lang="en-IN" b="1" i="0" u="none" strike="noStrike" dirty="0">
+                <a:solidFill>
+                  <a:schemeClr val="tx1"/>
+                </a:solidFill>
+                <a:effectLst/>
+              </a:rPr>
+              <a:t>Risk Assessment:</a:t>
+            </a:r>
+            <a:endParaRPr lang="en-IN" b="0" i="0" u="none" strike="noStrike" dirty="0">
+              <a:solidFill>
+                <a:schemeClr val="tx1"/>
+              </a:solidFill>
+              <a:effectLst/>
+            </a:endParaRPr>
+          </a:p>
+          <a:p>
+            <a:pPr marL="742950" lvl="1" indent="-285750" algn="l">
+              <a:buFont typeface="+mj-lt"/>
+              <a:buAutoNum type="arabicPeriod"/>
+            </a:pPr>
+            <a:r>
+              <a:rPr lang="en-IN" b="0" i="0" u="none" strike="noStrike" dirty="0">
+                <a:solidFill>
+                  <a:schemeClr val="tx1"/>
+                </a:solidFill>
+                <a:effectLst/>
+              </a:rPr>
+              <a:t>Identify and address potential risks.</a:t>
+            </a:r>
+          </a:p>
+          <a:p>
+            <a:pPr algn="l">
+              <a:buFont typeface="+mj-lt"/>
+              <a:buAutoNum type="arabicPeriod"/>
+            </a:pPr>
+            <a:r>
+              <a:rPr lang="en-IN" b="1" i="0" u="none" strike="noStrike" dirty="0">
+                <a:solidFill>
+                  <a:schemeClr val="tx1"/>
+                </a:solidFill>
+                <a:effectLst/>
+              </a:rPr>
+              <a:t>Review and Validation:</a:t>
+            </a:r>
+            <a:endParaRPr lang="en-IN" b="0" i="0" u="none" strike="noStrike" dirty="0">
+              <a:solidFill>
+                <a:schemeClr val="tx1"/>
+              </a:solidFill>
+              <a:effectLst/>
+            </a:endParaRPr>
+          </a:p>
+          <a:p>
+            <a:pPr marL="742950" lvl="1" indent="-285750" algn="l">
+              <a:buFont typeface="+mj-lt"/>
+              <a:buAutoNum type="arabicPeriod"/>
+            </a:pPr>
+            <a:r>
+              <a:rPr lang="en-IN" b="0" i="0" u="none" strike="noStrike" dirty="0">
+                <a:solidFill>
+                  <a:schemeClr val="tx1"/>
+                </a:solidFill>
+                <a:effectLst/>
+              </a:rPr>
+              <a:t>Regularly confirm alignment with stakeholders.</a:t>
+            </a:r>
+          </a:p>
+          <a:p>
+            <a:endParaRPr lang="en-US" dirty="0"/>
+          </a:p>
+        </p:txBody>
+      </p:sp>
+    </p:spTree>
+    <p:extLst>
+      <p:ext uri="{BB962C8B-B14F-4D97-AF65-F5344CB8AC3E}">
+        <p14:creationId xmlns:p14="http://schemas.microsoft.com/office/powerpoint/2010/main" val="354766995"/>
+      </p:ext>
+    </p:extLst>
+  </p:cSld>
+  <p:clrMapOvr>
+    <a:masterClrMapping/>
+  </p:clrMapOvr>
+</p:sld>
+</file>
+
+<file path=ppt/slides/slide9.xml><?xml version="1.0" encoding="utf-8"?>
+<p:sld xmlns:a="http://schemas.openxmlformats.org/drawingml/2006/main" xmlns:r="http://schemas.openxmlformats.org/officeDocument/2006/relationships" xmlns:p="http://schemas.openxmlformats.org/presentationml/2006/main">
+  <p:cSld>
+    <p:spTree>
+      <p:nvGrpSpPr>
+        <p:cNvPr id="1" name=""/>
+        <p:cNvGrpSpPr/>
+        <p:nvPr/>
+      </p:nvGrpSpPr>
+      <p:grpSpPr>
+        <a:xfrm>
+          <a:off x="0" y="0"/>
+          <a:ext cx="0" cy="0"/>
+          <a:chOff x="0" y="0"/>
+          <a:chExt cx="0" cy="0"/>
+        </a:xfrm>
+      </p:grpSpPr>
+      <p:sp>
+        <p:nvSpPr>
           <p:cNvPr id="2" name="Title 1">
             <a:extLst>
               <a:ext uri="{FF2B5EF4-FFF2-40B4-BE49-F238E27FC236}">
-                <a16:creationId xmlns:a16="http://schemas.microsoft.com/office/drawing/2014/main" id="{14702EC7-957B-3D7B-C591-0AFC4D35B4CF}"/>
+                <a16:creationId xmlns:a16="http://schemas.microsoft.com/office/drawing/2014/main" id="{944F52E6-B7BD-793E-F5D8-54580E132694}"/>
               </a:ext>
             </a:extLst>
           </p:cNvPr>
@@ -5200,152 +6122,527 @@
             <p:ph type="title"/>
           </p:nvPr>
         </p:nvSpPr>
-        <p:spPr>
-          <a:xfrm>
-            <a:off x="1371600" y="685800"/>
-            <a:ext cx="9601200" cy="722586"/>
-          </a:xfrm>
-        </p:spPr>
+        <p:spPr/>
         <p:txBody>
           <a:bodyPr/>
           <a:lstStyle/>
           <a:p>
-            <a:pPr algn="ctr"/>
             <a:r>
               <a:rPr lang="en-US" dirty="0"/>
-              <a:t>Reference</a:t>
-            </a:r>
-          </a:p>
-        </p:txBody>
-      </p:sp>
-      <p:sp>
-        <p:nvSpPr>
-          <p:cNvPr id="3" name="Content Placeholder 2">
+              <a:t>Literature Survey</a:t>
+            </a:r>
+          </a:p>
+        </p:txBody>
+      </p:sp>
+      <p:graphicFrame>
+        <p:nvGraphicFramePr>
+          <p:cNvPr id="4" name="Table 4">
             <a:extLst>
               <a:ext uri="{FF2B5EF4-FFF2-40B4-BE49-F238E27FC236}">
-                <a16:creationId xmlns:a16="http://schemas.microsoft.com/office/drawing/2014/main" id="{F136895F-0CA2-7D8D-B819-BF4EABBFFA60}"/>
+                <a16:creationId xmlns:a16="http://schemas.microsoft.com/office/drawing/2014/main" id="{625E2526-AB7E-152E-1D6A-062274699FBD}"/>
               </a:ext>
             </a:extLst>
           </p:cNvPr>
-          <p:cNvSpPr>
-            <a:spLocks noGrp="1"/>
-          </p:cNvSpPr>
+          <p:cNvGraphicFramePr>
+            <a:graphicFrameLocks noGrp="1"/>
+          </p:cNvGraphicFramePr>
           <p:nvPr>
             <p:ph idx="1"/>
-          </p:nvPr>
-        </p:nvSpPr>
-        <p:spPr>
-          <a:xfrm>
-            <a:off x="1371600" y="1638299"/>
-            <a:ext cx="9601200" cy="3932183"/>
-          </a:xfrm>
-        </p:spPr>
-        <p:txBody>
-          <a:bodyPr/>
-          <a:lstStyle/>
-          <a:p>
-            <a:pPr>
-              <a:buFont typeface="Wingdings" pitchFamily="2" charset="2"/>
-              <a:buChar char="§"/>
-            </a:pPr>
-            <a:r>
-              <a:rPr lang="en-US" dirty="0"/>
-              <a:t>Dataset Kaggle (</a:t>
-            </a:r>
-            <a:r>
-              <a:rPr lang="en-US" dirty="0">
-                <a:hlinkClick r:id="rId2"/>
-              </a:rPr>
-              <a:t>LINK</a:t>
-            </a:r>
-            <a:r>
-              <a:rPr lang="en-US" dirty="0"/>
-              <a:t>)</a:t>
-            </a:r>
-          </a:p>
-          <a:p>
-            <a:pPr>
-              <a:buFont typeface="Wingdings" pitchFamily="2" charset="2"/>
-              <a:buChar char="§"/>
-            </a:pPr>
-            <a:r>
-              <a:rPr lang="en-US" dirty="0"/>
-              <a:t>Crash Statistics Wikipedia (</a:t>
-            </a:r>
-            <a:r>
-              <a:rPr lang="en-US" dirty="0">
-                <a:hlinkClick r:id="rId3"/>
-              </a:rPr>
-              <a:t>LINK</a:t>
-            </a:r>
-            <a:r>
-              <a:rPr lang="en-US" dirty="0"/>
-              <a:t>)</a:t>
-            </a:r>
-          </a:p>
-          <a:p>
-            <a:pPr>
-              <a:buFont typeface="Wingdings" pitchFamily="2" charset="2"/>
-              <a:buChar char="§"/>
-            </a:pPr>
-            <a:r>
-              <a:rPr lang="en-US" dirty="0"/>
-              <a:t>Research Papers (</a:t>
-            </a:r>
-            <a:r>
-              <a:rPr lang="en-US" dirty="0">
-                <a:hlinkClick r:id="rId4"/>
-              </a:rPr>
-              <a:t>LINK</a:t>
-            </a:r>
-            <a:r>
-              <a:rPr lang="en-US" dirty="0"/>
-              <a:t> </a:t>
-            </a:r>
-            <a:r>
-              <a:rPr lang="en-US" dirty="0">
-                <a:hlinkClick r:id="rId5"/>
-              </a:rPr>
-              <a:t>LINK</a:t>
-            </a:r>
-            <a:r>
-              <a:rPr lang="en-US" dirty="0"/>
-              <a:t>)</a:t>
-            </a:r>
-          </a:p>
-          <a:p>
-            <a:pPr>
-              <a:buFont typeface="Wingdings" pitchFamily="2" charset="2"/>
-              <a:buChar char="§"/>
-            </a:pPr>
-            <a:r>
-              <a:rPr lang="en-US" dirty="0"/>
-              <a:t>Algorithms (</a:t>
-            </a:r>
-            <a:r>
-              <a:rPr lang="en-US" dirty="0">
-                <a:hlinkClick r:id="rId6"/>
-              </a:rPr>
-              <a:t>LINK</a:t>
-            </a:r>
-            <a:r>
-              <a:rPr lang="en-US" dirty="0"/>
-              <a:t>)</a:t>
-            </a:r>
-          </a:p>
-          <a:p>
-            <a:pPr>
-              <a:buFont typeface="Wingdings" pitchFamily="2" charset="2"/>
-              <a:buChar char="§"/>
-            </a:pPr>
-            <a:endParaRPr lang="en-US" dirty="0"/>
-          </a:p>
-        </p:txBody>
-      </p:sp>
+            <p:extLst>
+              <p:ext uri="{D42A27DB-BD31-4B8C-83A1-F6EECF244321}">
+                <p14:modId xmlns:p14="http://schemas.microsoft.com/office/powerpoint/2010/main" val="813628455"/>
+              </p:ext>
+            </p:extLst>
+          </p:nvPr>
+        </p:nvGraphicFramePr>
+        <p:xfrm>
+          <a:off x="1371600" y="2286000"/>
+          <a:ext cx="9601197" cy="4876800"/>
+        </p:xfrm>
+        <a:graphic>
+          <a:graphicData uri="http://schemas.openxmlformats.org/drawingml/2006/table">
+            <a:tbl>
+              <a:tblPr firstRow="1" bandRow="1">
+                <a:tableStyleId>{5C22544A-7EE6-4342-B048-85BDC9FD1C3A}</a:tableStyleId>
+              </a:tblPr>
+              <a:tblGrid>
+                <a:gridCol w="2085975">
+                  <a:extLst>
+                    <a:ext uri="{9D8B030D-6E8A-4147-A177-3AD203B41FA5}">
+                      <a16:colId xmlns:a16="http://schemas.microsoft.com/office/drawing/2014/main" val="2380705442"/>
+                    </a:ext>
+                  </a:extLst>
+                </a:gridCol>
+                <a:gridCol w="3257550">
+                  <a:extLst>
+                    <a:ext uri="{9D8B030D-6E8A-4147-A177-3AD203B41FA5}">
+                      <a16:colId xmlns:a16="http://schemas.microsoft.com/office/drawing/2014/main" val="2204251285"/>
+                    </a:ext>
+                  </a:extLst>
+                </a:gridCol>
+                <a:gridCol w="4257672">
+                  <a:extLst>
+                    <a:ext uri="{9D8B030D-6E8A-4147-A177-3AD203B41FA5}">
+                      <a16:colId xmlns:a16="http://schemas.microsoft.com/office/drawing/2014/main" val="1299214240"/>
+                    </a:ext>
+                  </a:extLst>
+                </a:gridCol>
+              </a:tblGrid>
+              <a:tr h="370840">
+                <a:tc>
+                  <a:txBody>
+                    <a:bodyPr/>
+                    <a:lstStyle/>
+                    <a:p>
+                      <a:r>
+                        <a:rPr lang="en-US" dirty="0"/>
+                        <a:t>Year of Publishing </a:t>
+                      </a:r>
+                    </a:p>
+                  </a:txBody>
+                  <a:tcPr/>
+                </a:tc>
+                <a:tc>
+                  <a:txBody>
+                    <a:bodyPr/>
+                    <a:lstStyle/>
+                    <a:p>
+                      <a:r>
+                        <a:rPr lang="en-US" dirty="0"/>
+                        <a:t>Topic and Algorithm</a:t>
+                      </a:r>
+                    </a:p>
+                  </a:txBody>
+                  <a:tcPr/>
+                </a:tc>
+                <a:tc>
+                  <a:txBody>
+                    <a:bodyPr/>
+                    <a:lstStyle/>
+                    <a:p>
+                      <a:r>
+                        <a:rPr lang="en-US" dirty="0"/>
+                        <a:t>Limitations</a:t>
+                      </a:r>
+                    </a:p>
+                  </a:txBody>
+                  <a:tcPr/>
+                </a:tc>
+                <a:extLst>
+                  <a:ext uri="{0D108BD9-81ED-4DB2-BD59-A6C34878D82A}">
+                    <a16:rowId xmlns:a16="http://schemas.microsoft.com/office/drawing/2014/main" val="2976646288"/>
+                  </a:ext>
+                </a:extLst>
+              </a:tr>
+              <a:tr h="370840">
+                <a:tc>
+                  <a:txBody>
+                    <a:bodyPr/>
+                    <a:lstStyle/>
+                    <a:p>
+                      <a:r>
+                        <a:rPr lang="en-US" dirty="0"/>
+                        <a:t>2020</a:t>
+                      </a:r>
+                    </a:p>
+                  </a:txBody>
+                  <a:tcPr/>
+                </a:tc>
+                <a:tc>
+                  <a:txBody>
+                    <a:bodyPr/>
+                    <a:lstStyle/>
+                    <a:p>
+                      <a:pPr marL="0" marR="0" lvl="0" indent="0" algn="l" defTabSz="914400" rtl="0" eaLnBrk="1" fontAlgn="auto" latinLnBrk="0" hangingPunct="1">
+                        <a:lnSpc>
+                          <a:spcPct val="100000"/>
+                        </a:lnSpc>
+                        <a:spcBef>
+                          <a:spcPts val="0"/>
+                        </a:spcBef>
+                        <a:spcAft>
+                          <a:spcPts val="0"/>
+                        </a:spcAft>
+                        <a:buClrTx/>
+                        <a:buSzTx/>
+                        <a:buFontTx/>
+                        <a:buNone/>
+                        <a:tabLst/>
+                        <a:defRPr/>
+                      </a:pPr>
+                      <a:r>
+                        <a:rPr lang="en-IN" sz="1800" b="1" i="0" u="none" strike="noStrike" kern="1200" dirty="0">
+                          <a:solidFill>
+                            <a:schemeClr val="dk1"/>
+                          </a:solidFill>
+                          <a:effectLst/>
+                          <a:latin typeface="+mn-lt"/>
+                          <a:ea typeface="+mn-ea"/>
+                          <a:cs typeface="+mn-cs"/>
+                        </a:rPr>
+                        <a:t>Mixed Vertical-and-Horizontal-Text Traffic Sign Detection and Recognition for Street-Level Scene</a:t>
+                      </a:r>
+                    </a:p>
+                  </a:txBody>
+                  <a:tcPr/>
+                </a:tc>
+                <a:tc>
+                  <a:txBody>
+                    <a:bodyPr/>
+                    <a:lstStyle/>
+                    <a:p>
+                      <a:pPr marL="285750" marR="0" lvl="0" indent="-285750" algn="l" defTabSz="914400" rtl="0" eaLnBrk="1" fontAlgn="auto" latinLnBrk="0" hangingPunct="1">
+                        <a:lnSpc>
+                          <a:spcPct val="100000"/>
+                        </a:lnSpc>
+                        <a:spcBef>
+                          <a:spcPts val="0"/>
+                        </a:spcBef>
+                        <a:spcAft>
+                          <a:spcPts val="0"/>
+                        </a:spcAft>
+                        <a:buClrTx/>
+                        <a:buSzTx/>
+                        <a:buFont typeface="Arial" panose="020B0604020202020204" pitchFamily="34" charset="0"/>
+                        <a:buChar char="•"/>
+                        <a:tabLst/>
+                        <a:defRPr/>
+                      </a:pPr>
+                      <a:r>
+                        <a:rPr lang="en-IN" sz="1800" kern="1200" dirty="0">
+                          <a:solidFill>
+                            <a:schemeClr val="dk1"/>
+                          </a:solidFill>
+                          <a:effectLst/>
+                          <a:latin typeface="+mn-lt"/>
+                          <a:ea typeface="+mn-ea"/>
+                          <a:cs typeface="+mn-cs"/>
+                        </a:rPr>
+                        <a:t>The Chinese characters on text-based traffic signs are always in the form of a text line.</a:t>
+                      </a:r>
+                    </a:p>
+                    <a:p>
+                      <a:pPr marL="285750" marR="0" lvl="0" indent="-285750" algn="l" defTabSz="914400" rtl="0" eaLnBrk="1" fontAlgn="auto" latinLnBrk="0" hangingPunct="1">
+                        <a:lnSpc>
+                          <a:spcPct val="100000"/>
+                        </a:lnSpc>
+                        <a:spcBef>
+                          <a:spcPts val="0"/>
+                        </a:spcBef>
+                        <a:spcAft>
+                          <a:spcPts val="0"/>
+                        </a:spcAft>
+                        <a:buClrTx/>
+                        <a:buSzTx/>
+                        <a:buFont typeface="Arial" panose="020B0604020202020204" pitchFamily="34" charset="0"/>
+                        <a:buChar char="•"/>
+                        <a:tabLst/>
+                        <a:defRPr/>
+                      </a:pPr>
+                      <a:r>
+                        <a:rPr lang="en-IN" sz="1800" kern="1200" dirty="0">
+                          <a:solidFill>
+                            <a:schemeClr val="dk1"/>
+                          </a:solidFill>
+                          <a:effectLst/>
+                          <a:latin typeface="+mn-lt"/>
+                          <a:ea typeface="+mn-ea"/>
+                          <a:cs typeface="+mn-cs"/>
+                        </a:rPr>
+                        <a:t>There are both horizontal and vertical text lines.</a:t>
+                      </a:r>
+                      <a:endParaRPr lang="en-IN" dirty="0"/>
+                    </a:p>
+                    <a:p>
+                      <a:pPr marL="0" marR="0" lvl="0" indent="0" algn="l" defTabSz="914400" rtl="0" eaLnBrk="1" fontAlgn="auto" latinLnBrk="0" hangingPunct="1">
+                        <a:lnSpc>
+                          <a:spcPct val="100000"/>
+                        </a:lnSpc>
+                        <a:spcBef>
+                          <a:spcPts val="0"/>
+                        </a:spcBef>
+                        <a:spcAft>
+                          <a:spcPts val="0"/>
+                        </a:spcAft>
+                        <a:buClrTx/>
+                        <a:buSzTx/>
+                        <a:buFontTx/>
+                        <a:buNone/>
+                        <a:tabLst/>
+                        <a:defRPr/>
+                      </a:pPr>
+                      <a:endParaRPr lang="en-IN" dirty="0"/>
+                    </a:p>
+                  </a:txBody>
+                  <a:tcPr/>
+                </a:tc>
+                <a:extLst>
+                  <a:ext uri="{0D108BD9-81ED-4DB2-BD59-A6C34878D82A}">
+                    <a16:rowId xmlns:a16="http://schemas.microsoft.com/office/drawing/2014/main" val="1150630108"/>
+                  </a:ext>
+                </a:extLst>
+              </a:tr>
+              <a:tr h="370840">
+                <a:tc>
+                  <a:txBody>
+                    <a:bodyPr/>
+                    <a:lstStyle/>
+                    <a:p>
+                      <a:r>
+                        <a:rPr lang="en-US" dirty="0"/>
+                        <a:t>2023</a:t>
+                      </a:r>
+                    </a:p>
+                  </a:txBody>
+                  <a:tcPr/>
+                </a:tc>
+                <a:tc>
+                  <a:txBody>
+                    <a:bodyPr/>
+                    <a:lstStyle/>
+                    <a:p>
+                      <a:pPr marL="0" marR="0" lvl="0" indent="0" algn="l" defTabSz="914400" rtl="0" eaLnBrk="1" fontAlgn="auto" latinLnBrk="0" hangingPunct="1">
+                        <a:lnSpc>
+                          <a:spcPct val="100000"/>
+                        </a:lnSpc>
+                        <a:spcBef>
+                          <a:spcPts val="0"/>
+                        </a:spcBef>
+                        <a:spcAft>
+                          <a:spcPts val="0"/>
+                        </a:spcAft>
+                        <a:buClrTx/>
+                        <a:buSzTx/>
+                        <a:buFontTx/>
+                        <a:buNone/>
+                        <a:tabLst/>
+                        <a:defRPr/>
+                      </a:pPr>
+                      <a:r>
+                        <a:rPr lang="en-IN" sz="1800" b="1" i="0" u="none" strike="noStrike" kern="1200" dirty="0">
+                          <a:solidFill>
+                            <a:schemeClr val="dk1"/>
+                          </a:solidFill>
+                          <a:effectLst/>
+                          <a:latin typeface="+mn-lt"/>
+                          <a:ea typeface="+mn-ea"/>
+                          <a:cs typeface="+mn-cs"/>
+                        </a:rPr>
+                        <a:t>A Traffic Sign Recognition Method Under Complex Illumination Conditions</a:t>
+                      </a:r>
+                    </a:p>
+                  </a:txBody>
+                  <a:tcPr/>
+                </a:tc>
+                <a:tc>
+                  <a:txBody>
+                    <a:bodyPr/>
+                    <a:lstStyle/>
+                    <a:p>
+                      <a:endParaRPr lang="en-US" dirty="0"/>
+                    </a:p>
+                  </a:txBody>
+                  <a:tcPr/>
+                </a:tc>
+                <a:extLst>
+                  <a:ext uri="{0D108BD9-81ED-4DB2-BD59-A6C34878D82A}">
+                    <a16:rowId xmlns:a16="http://schemas.microsoft.com/office/drawing/2014/main" val="1008544802"/>
+                  </a:ext>
+                </a:extLst>
+              </a:tr>
+              <a:tr h="370840">
+                <a:tc>
+                  <a:txBody>
+                    <a:bodyPr/>
+                    <a:lstStyle/>
+                    <a:p>
+                      <a:endParaRPr lang="en-US"/>
+                    </a:p>
+                  </a:txBody>
+                  <a:tcPr/>
+                </a:tc>
+                <a:tc>
+                  <a:txBody>
+                    <a:bodyPr/>
+                    <a:lstStyle/>
+                    <a:p>
+                      <a:endParaRPr lang="en-US"/>
+                    </a:p>
+                  </a:txBody>
+                  <a:tcPr/>
+                </a:tc>
+                <a:tc>
+                  <a:txBody>
+                    <a:bodyPr/>
+                    <a:lstStyle/>
+                    <a:p>
+                      <a:endParaRPr lang="en-US"/>
+                    </a:p>
+                  </a:txBody>
+                  <a:tcPr/>
+                </a:tc>
+                <a:extLst>
+                  <a:ext uri="{0D108BD9-81ED-4DB2-BD59-A6C34878D82A}">
+                    <a16:rowId xmlns:a16="http://schemas.microsoft.com/office/drawing/2014/main" val="2911132657"/>
+                  </a:ext>
+                </a:extLst>
+              </a:tr>
+              <a:tr h="370840">
+                <a:tc>
+                  <a:txBody>
+                    <a:bodyPr/>
+                    <a:lstStyle/>
+                    <a:p>
+                      <a:endParaRPr lang="en-US"/>
+                    </a:p>
+                  </a:txBody>
+                  <a:tcPr/>
+                </a:tc>
+                <a:tc>
+                  <a:txBody>
+                    <a:bodyPr/>
+                    <a:lstStyle/>
+                    <a:p>
+                      <a:endParaRPr lang="en-US"/>
+                    </a:p>
+                  </a:txBody>
+                  <a:tcPr/>
+                </a:tc>
+                <a:tc>
+                  <a:txBody>
+                    <a:bodyPr/>
+                    <a:lstStyle/>
+                    <a:p>
+                      <a:endParaRPr lang="en-US"/>
+                    </a:p>
+                  </a:txBody>
+                  <a:tcPr/>
+                </a:tc>
+                <a:extLst>
+                  <a:ext uri="{0D108BD9-81ED-4DB2-BD59-A6C34878D82A}">
+                    <a16:rowId xmlns:a16="http://schemas.microsoft.com/office/drawing/2014/main" val="2298497524"/>
+                  </a:ext>
+                </a:extLst>
+              </a:tr>
+              <a:tr h="370840">
+                <a:tc>
+                  <a:txBody>
+                    <a:bodyPr/>
+                    <a:lstStyle/>
+                    <a:p>
+                      <a:endParaRPr lang="en-US"/>
+                    </a:p>
+                  </a:txBody>
+                  <a:tcPr/>
+                </a:tc>
+                <a:tc>
+                  <a:txBody>
+                    <a:bodyPr/>
+                    <a:lstStyle/>
+                    <a:p>
+                      <a:endParaRPr lang="en-US"/>
+                    </a:p>
+                  </a:txBody>
+                  <a:tcPr/>
+                </a:tc>
+                <a:tc>
+                  <a:txBody>
+                    <a:bodyPr/>
+                    <a:lstStyle/>
+                    <a:p>
+                      <a:endParaRPr lang="en-US"/>
+                    </a:p>
+                  </a:txBody>
+                  <a:tcPr/>
+                </a:tc>
+                <a:extLst>
+                  <a:ext uri="{0D108BD9-81ED-4DB2-BD59-A6C34878D82A}">
+                    <a16:rowId xmlns:a16="http://schemas.microsoft.com/office/drawing/2014/main" val="3292674368"/>
+                  </a:ext>
+                </a:extLst>
+              </a:tr>
+              <a:tr h="370840">
+                <a:tc>
+                  <a:txBody>
+                    <a:bodyPr/>
+                    <a:lstStyle/>
+                    <a:p>
+                      <a:endParaRPr lang="en-US"/>
+                    </a:p>
+                  </a:txBody>
+                  <a:tcPr/>
+                </a:tc>
+                <a:tc>
+                  <a:txBody>
+                    <a:bodyPr/>
+                    <a:lstStyle/>
+                    <a:p>
+                      <a:endParaRPr lang="en-US"/>
+                    </a:p>
+                  </a:txBody>
+                  <a:tcPr/>
+                </a:tc>
+                <a:tc>
+                  <a:txBody>
+                    <a:bodyPr/>
+                    <a:lstStyle/>
+                    <a:p>
+                      <a:endParaRPr lang="en-US"/>
+                    </a:p>
+                  </a:txBody>
+                  <a:tcPr/>
+                </a:tc>
+                <a:extLst>
+                  <a:ext uri="{0D108BD9-81ED-4DB2-BD59-A6C34878D82A}">
+                    <a16:rowId xmlns:a16="http://schemas.microsoft.com/office/drawing/2014/main" val="3398123463"/>
+                  </a:ext>
+                </a:extLst>
+              </a:tr>
+              <a:tr h="370840">
+                <a:tc>
+                  <a:txBody>
+                    <a:bodyPr/>
+                    <a:lstStyle/>
+                    <a:p>
+                      <a:endParaRPr lang="en-US"/>
+                    </a:p>
+                  </a:txBody>
+                  <a:tcPr/>
+                </a:tc>
+                <a:tc>
+                  <a:txBody>
+                    <a:bodyPr/>
+                    <a:lstStyle/>
+                    <a:p>
+                      <a:endParaRPr lang="en-US"/>
+                    </a:p>
+                  </a:txBody>
+                  <a:tcPr/>
+                </a:tc>
+                <a:tc>
+                  <a:txBody>
+                    <a:bodyPr/>
+                    <a:lstStyle/>
+                    <a:p>
+                      <a:endParaRPr lang="en-US" dirty="0"/>
+                    </a:p>
+                  </a:txBody>
+                  <a:tcPr/>
+                </a:tc>
+                <a:extLst>
+                  <a:ext uri="{0D108BD9-81ED-4DB2-BD59-A6C34878D82A}">
+                    <a16:rowId xmlns:a16="http://schemas.microsoft.com/office/drawing/2014/main" val="277943573"/>
+                  </a:ext>
+                </a:extLst>
+              </a:tr>
+            </a:tbl>
+          </a:graphicData>
+        </a:graphic>
+      </p:graphicFrame>
     </p:spTree>
     <p:extLst>
       <p:ext uri="{BB962C8B-B14F-4D97-AF65-F5344CB8AC3E}">
-        <p14:creationId xmlns:p14="http://schemas.microsoft.com/office/powerpoint/2010/main" val="1081541707"/>
+        <p14:creationId xmlns:p14="http://schemas.microsoft.com/office/powerpoint/2010/main" val="773303114"/>
       </p:ext>
     </p:extLst>
   </p:cSld>

</xml_diff>